<commit_message>
Add function for play, stop, and add text canvas
</commit_message>
<xml_diff>
--- a/public/Hatsune Miku Programming Contest.pptx
+++ b/public/Hatsune Miku Programming Contest.pptx
@@ -123,12 +123,12 @@
   <p:extLst>
     <p:ext uri="{EFAFB233-063F-42B5-8137-9DF3F51BA10A}">
       <p15:sldGuideLst xmlns:p15="http://schemas.microsoft.com/office/powerpoint/2012/main">
-        <p15:guide id="1" orient="horz" pos="2122" userDrawn="1">
+        <p15:guide id="1" orient="horz" pos="2082" userDrawn="1">
           <p15:clr>
             <a:srgbClr val="A4A3A4"/>
           </p15:clr>
         </p15:guide>
-        <p15:guide id="2" pos="2880" userDrawn="1">
+        <p15:guide id="2" pos="2878" userDrawn="1">
           <p15:clr>
             <a:srgbClr val="A4A3A4"/>
           </p15:clr>
@@ -16639,392 +16639,28 @@
       </p:sp>
       <p:grpSp>
         <p:nvGrpSpPr>
-          <p:cNvPr id="515" name="Group 514"/>
+          <p:cNvPr id="457" name="Group 457"/>
           <p:cNvGrpSpPr/>
           <p:nvPr/>
         </p:nvGrpSpPr>
         <p:grpSpPr>
-          <a:xfrm>
+          <a:xfrm rot="0">
             <a:off x="1875790" y="9922510"/>
             <a:ext cx="1705610" cy="288290"/>
-            <a:chOff x="2954" y="15626"/>
-            <a:chExt cx="2686" cy="454"/>
+            <a:chOff x="0" y="0"/>
+            <a:chExt cx="924520" cy="156343"/>
           </a:xfrm>
         </p:grpSpPr>
-        <p:grpSp>
-          <p:nvGrpSpPr>
-            <p:cNvPr id="457" name="Group 457"/>
-            <p:cNvGrpSpPr/>
-            <p:nvPr/>
-          </p:nvGrpSpPr>
-          <p:grpSpPr>
-            <a:xfrm rot="0">
-              <a:off x="2954" y="15626"/>
-              <a:ext cx="2686" cy="454"/>
-              <a:chOff x="0" y="0"/>
-              <a:chExt cx="924520" cy="156343"/>
-            </a:xfrm>
-          </p:grpSpPr>
-          <p:sp>
-            <p:nvSpPr>
-              <p:cNvPr id="458" name="Freeform 458"/>
-              <p:cNvSpPr/>
-              <p:nvPr/>
-            </p:nvSpPr>
-            <p:spPr>
-              <a:xfrm>
-                <a:off x="0" y="0"/>
-                <a:ext cx="924520" cy="156343"/>
-              </a:xfrm>
-              <a:custGeom>
-                <a:avLst/>
-                <a:gdLst/>
-                <a:ahLst/>
-                <a:cxnLst/>
-                <a:rect l="l" t="t" r="r" b="b"/>
-                <a:pathLst>
-                  <a:path w="924520" h="156343">
-                    <a:moveTo>
-                      <a:pt x="45395" y="0"/>
-                    </a:moveTo>
-                    <a:lnTo>
-                      <a:pt x="879124" y="0"/>
-                    </a:lnTo>
-                    <a:cubicBezTo>
-                      <a:pt x="904195" y="0"/>
-                      <a:pt x="924520" y="20324"/>
-                      <a:pt x="924520" y="45395"/>
-                    </a:cubicBezTo>
-                    <a:lnTo>
-                      <a:pt x="924520" y="110948"/>
-                    </a:lnTo>
-                    <a:cubicBezTo>
-                      <a:pt x="924520" y="122988"/>
-                      <a:pt x="919737" y="134534"/>
-                      <a:pt x="911224" y="143048"/>
-                    </a:cubicBezTo>
-                    <a:cubicBezTo>
-                      <a:pt x="902710" y="151561"/>
-                      <a:pt x="891164" y="156343"/>
-                      <a:pt x="879124" y="156343"/>
-                    </a:cubicBezTo>
-                    <a:lnTo>
-                      <a:pt x="45395" y="156343"/>
-                    </a:lnTo>
-                    <a:cubicBezTo>
-                      <a:pt x="33356" y="156343"/>
-                      <a:pt x="21809" y="151561"/>
-                      <a:pt x="13296" y="143048"/>
-                    </a:cubicBezTo>
-                    <a:cubicBezTo>
-                      <a:pt x="4783" y="134534"/>
-                      <a:pt x="0" y="122988"/>
-                      <a:pt x="0" y="110948"/>
-                    </a:cubicBezTo>
-                    <a:lnTo>
-                      <a:pt x="0" y="45395"/>
-                    </a:lnTo>
-                    <a:cubicBezTo>
-                      <a:pt x="0" y="33356"/>
-                      <a:pt x="4783" y="21809"/>
-                      <a:pt x="13296" y="13296"/>
-                    </a:cubicBezTo>
-                    <a:cubicBezTo>
-                      <a:pt x="21809" y="4783"/>
-                      <a:pt x="33356" y="0"/>
-                      <a:pt x="45395" y="0"/>
-                    </a:cubicBezTo>
-                    <a:close/>
-                  </a:path>
-                </a:pathLst>
-              </a:custGeom>
-              <a:solidFill>
-                <a:srgbClr val="000000"/>
-              </a:solidFill>
-              <a:ln w="28575" cap="sq">
-                <a:solidFill>
-                  <a:srgbClr val="70767A"/>
-                </a:solidFill>
-                <a:prstDash val="solid"/>
-                <a:miter/>
-              </a:ln>
-            </p:spPr>
-          </p:sp>
-          <p:sp>
-            <p:nvSpPr>
-              <p:cNvPr id="459" name="TextBox 459"/>
-              <p:cNvSpPr txBox="1"/>
-              <p:nvPr/>
-            </p:nvSpPr>
-            <p:spPr>
-              <a:xfrm>
-                <a:off x="0" y="-38100"/>
-                <a:ext cx="924520" cy="194443"/>
-              </a:xfrm>
-              <a:prstGeom prst="rect">
-                <a:avLst/>
-              </a:prstGeom>
-            </p:spPr>
-            <p:txBody>
-              <a:bodyPr lIns="24681" tIns="24681" rIns="24681" bIns="24681" rtlCol="0" anchor="ctr"/>
-              <a:lstStyle/>
-              <a:p>
-                <a:pPr algn="ctr">
-                  <a:lnSpc>
-                    <a:spcPts val="2660"/>
-                  </a:lnSpc>
-                  <a:spcBef>
-                    <a:spcPct val="0"/>
-                  </a:spcBef>
-                </a:pPr>
-              </a:p>
-            </p:txBody>
-          </p:sp>
-        </p:grpSp>
         <p:sp>
           <p:nvSpPr>
-            <p:cNvPr id="460" name="AutoShape 460"/>
+            <p:cNvPr id="458" name="Freeform 458"/>
             <p:cNvSpPr/>
             <p:nvPr/>
           </p:nvSpPr>
           <p:spPr>
-            <a:xfrm flipV="1">
-              <a:off x="3366" y="15626"/>
-              <a:ext cx="0" cy="454"/>
-            </a:xfrm>
-            <a:prstGeom prst="line">
-              <a:avLst/>
-            </a:prstGeom>
-            <a:ln w="19050" cap="flat">
-              <a:solidFill>
-                <a:srgbClr val="70767A"/>
-              </a:solidFill>
-              <a:prstDash val="solid"/>
-              <a:headEnd type="none" w="sm" len="sm"/>
-              <a:tailEnd type="none" w="sm" len="sm"/>
-            </a:ln>
-          </p:spPr>
-        </p:sp>
-        <p:grpSp>
-          <p:nvGrpSpPr>
-            <p:cNvPr id="461" name="Group 461"/>
-            <p:cNvGrpSpPr/>
-            <p:nvPr/>
-          </p:nvGrpSpPr>
-          <p:grpSpPr>
-            <a:xfrm rot="0">
-              <a:off x="3195" y="15822"/>
-              <a:ext cx="26" cy="26"/>
-              <a:chOff x="0" y="0"/>
-              <a:chExt cx="523151" cy="523151"/>
-            </a:xfrm>
-          </p:grpSpPr>
-          <p:sp>
-            <p:nvSpPr>
-              <p:cNvPr id="462" name="Freeform 462"/>
-              <p:cNvSpPr/>
-              <p:nvPr/>
-            </p:nvSpPr>
-            <p:spPr>
-              <a:xfrm>
-                <a:off x="0" y="0"/>
-                <a:ext cx="523151" cy="523151"/>
-              </a:xfrm>
-              <a:custGeom>
-                <a:avLst/>
-                <a:gdLst/>
-                <a:ahLst/>
-                <a:cxnLst/>
-                <a:rect l="l" t="t" r="r" b="b"/>
-                <a:pathLst>
-                  <a:path w="523151" h="523151">
-                    <a:moveTo>
-                      <a:pt x="261575" y="0"/>
-                    </a:moveTo>
-                    <a:cubicBezTo>
-                      <a:pt x="117111" y="0"/>
-                      <a:pt x="0" y="117111"/>
-                      <a:pt x="0" y="261575"/>
-                    </a:cubicBezTo>
-                    <a:cubicBezTo>
-                      <a:pt x="0" y="406040"/>
-                      <a:pt x="117111" y="523151"/>
-                      <a:pt x="261575" y="523151"/>
-                    </a:cubicBezTo>
-                    <a:cubicBezTo>
-                      <a:pt x="406040" y="523151"/>
-                      <a:pt x="523151" y="406040"/>
-                      <a:pt x="523151" y="261575"/>
-                    </a:cubicBezTo>
-                    <a:cubicBezTo>
-                      <a:pt x="523151" y="117111"/>
-                      <a:pt x="406040" y="0"/>
-                      <a:pt x="261575" y="0"/>
-                    </a:cubicBezTo>
-                    <a:close/>
-                  </a:path>
-                </a:pathLst>
-              </a:custGeom>
-              <a:solidFill>
-                <a:srgbClr val="2F3238"/>
-              </a:solidFill>
-            </p:spPr>
-          </p:sp>
-          <p:sp>
-            <p:nvSpPr>
-              <p:cNvPr id="463" name="TextBox 463"/>
-              <p:cNvSpPr txBox="1"/>
-              <p:nvPr/>
-            </p:nvSpPr>
-            <p:spPr>
-              <a:xfrm>
-                <a:off x="49045" y="10945"/>
-                <a:ext cx="425060" cy="463160"/>
-              </a:xfrm>
-              <a:prstGeom prst="rect">
-                <a:avLst/>
-              </a:prstGeom>
-            </p:spPr>
-            <p:txBody>
-              <a:bodyPr lIns="17901" tIns="17901" rIns="17901" bIns="17901" rtlCol="0" anchor="ctr"/>
-              <a:lstStyle/>
-              <a:p>
-                <a:pPr algn="ctr">
-                  <a:lnSpc>
-                    <a:spcPts val="2660"/>
-                  </a:lnSpc>
-                </a:pPr>
-              </a:p>
-            </p:txBody>
-          </p:sp>
-        </p:grpSp>
-        <p:grpSp>
-          <p:nvGrpSpPr>
-            <p:cNvPr id="464" name="Group 464"/>
-            <p:cNvGrpSpPr/>
-            <p:nvPr/>
-          </p:nvGrpSpPr>
-          <p:grpSpPr>
-            <a:xfrm rot="0">
-              <a:off x="3178" y="15828"/>
-              <a:ext cx="26" cy="26"/>
-              <a:chOff x="0" y="0"/>
-              <a:chExt cx="523151" cy="523151"/>
-            </a:xfrm>
-          </p:grpSpPr>
-          <p:sp>
-            <p:nvSpPr>
-              <p:cNvPr id="465" name="Freeform 465"/>
-              <p:cNvSpPr/>
-              <p:nvPr/>
-            </p:nvSpPr>
-            <p:spPr>
-              <a:xfrm>
-                <a:off x="0" y="0"/>
-                <a:ext cx="523151" cy="523151"/>
-              </a:xfrm>
-              <a:custGeom>
-                <a:avLst/>
-                <a:gdLst/>
-                <a:ahLst/>
-                <a:cxnLst/>
-                <a:rect l="l" t="t" r="r" b="b"/>
-                <a:pathLst>
-                  <a:path w="523151" h="523151">
-                    <a:moveTo>
-                      <a:pt x="261575" y="0"/>
-                    </a:moveTo>
-                    <a:cubicBezTo>
-                      <a:pt x="117111" y="0"/>
-                      <a:pt x="0" y="117111"/>
-                      <a:pt x="0" y="261575"/>
-                    </a:cubicBezTo>
-                    <a:cubicBezTo>
-                      <a:pt x="0" y="406040"/>
-                      <a:pt x="117111" y="523151"/>
-                      <a:pt x="261575" y="523151"/>
-                    </a:cubicBezTo>
-                    <a:cubicBezTo>
-                      <a:pt x="406040" y="523151"/>
-                      <a:pt x="523151" y="406040"/>
-                      <a:pt x="523151" y="261575"/>
-                    </a:cubicBezTo>
-                    <a:cubicBezTo>
-                      <a:pt x="523151" y="117111"/>
-                      <a:pt x="406040" y="0"/>
-                      <a:pt x="261575" y="0"/>
-                    </a:cubicBezTo>
-                    <a:close/>
-                  </a:path>
-                </a:pathLst>
-              </a:custGeom>
-              <a:solidFill>
-                <a:srgbClr val="2F3238"/>
-              </a:solidFill>
-            </p:spPr>
-          </p:sp>
-          <p:sp>
-            <p:nvSpPr>
-              <p:cNvPr id="466" name="TextBox 466"/>
-              <p:cNvSpPr txBox="1"/>
-              <p:nvPr/>
-            </p:nvSpPr>
-            <p:spPr>
-              <a:xfrm>
-                <a:off x="49045" y="10945"/>
-                <a:ext cx="425060" cy="463160"/>
-              </a:xfrm>
-              <a:prstGeom prst="rect">
-                <a:avLst/>
-              </a:prstGeom>
-            </p:spPr>
-            <p:txBody>
-              <a:bodyPr lIns="17901" tIns="17901" rIns="17901" bIns="17901" rtlCol="0" anchor="ctr"/>
-              <a:lstStyle/>
-              <a:p>
-                <a:pPr algn="ctr">
-                  <a:lnSpc>
-                    <a:spcPts val="2660"/>
-                  </a:lnSpc>
-                </a:pPr>
-              </a:p>
-            </p:txBody>
-          </p:sp>
-        </p:grpSp>
-        <p:sp>
-          <p:nvSpPr>
-            <p:cNvPr id="467" name="AutoShape 467"/>
-            <p:cNvSpPr/>
-            <p:nvPr/>
-          </p:nvSpPr>
-          <p:spPr>
-            <a:xfrm flipV="1">
-              <a:off x="3145" y="15744"/>
-              <a:ext cx="0" cy="220"/>
-            </a:xfrm>
-            <a:prstGeom prst="line">
-              <a:avLst/>
-            </a:prstGeom>
-            <a:ln w="19050" cap="flat">
-              <a:solidFill>
-                <a:srgbClr val="FFFFFF"/>
-              </a:solidFill>
-              <a:prstDash val="solid"/>
-              <a:headEnd type="none" w="sm" len="sm"/>
-              <a:tailEnd type="none" w="sm" len="sm"/>
-            </a:ln>
-          </p:spPr>
-        </p:sp>
-        <p:sp>
-          <p:nvSpPr>
-            <p:cNvPr id="468" name="Freeform 468"/>
-            <p:cNvSpPr/>
-            <p:nvPr/>
-          </p:nvSpPr>
-          <p:spPr>
-            <a:xfrm rot="5400000">
-              <a:off x="3145" y="15741"/>
-              <a:ext cx="126" cy="126"/>
+            <a:xfrm>
+              <a:off x="0" y="0"/>
+              <a:ext cx="924520" cy="156343"/>
             </a:xfrm>
             <a:custGeom>
               <a:avLst/>
@@ -17033,41 +16669,390 @@
               <a:cxnLst/>
               <a:rect l="l" t="t" r="r" b="b"/>
               <a:pathLst>
-                <a:path w="80316" h="80316">
+                <a:path w="924520" h="156343">
                   <a:moveTo>
-                    <a:pt x="0" y="0"/>
+                    <a:pt x="45395" y="0"/>
                   </a:moveTo>
                   <a:lnTo>
-                    <a:pt x="80316" y="0"/>
-                  </a:lnTo>
-                  <a:lnTo>
-                    <a:pt x="80316" y="80316"/>
-                  </a:lnTo>
-                  <a:lnTo>
-                    <a:pt x="0" y="80316"/>
-                  </a:lnTo>
-                  <a:lnTo>
-                    <a:pt x="0" y="0"/>
-                  </a:lnTo>
+                    <a:pt x="879124" y="0"/>
+                  </a:lnTo>
+                  <a:cubicBezTo>
+                    <a:pt x="904195" y="0"/>
+                    <a:pt x="924520" y="20324"/>
+                    <a:pt x="924520" y="45395"/>
+                  </a:cubicBezTo>
+                  <a:lnTo>
+                    <a:pt x="924520" y="110948"/>
+                  </a:lnTo>
+                  <a:cubicBezTo>
+                    <a:pt x="924520" y="122988"/>
+                    <a:pt x="919737" y="134534"/>
+                    <a:pt x="911224" y="143048"/>
+                  </a:cubicBezTo>
+                  <a:cubicBezTo>
+                    <a:pt x="902710" y="151561"/>
+                    <a:pt x="891164" y="156343"/>
+                    <a:pt x="879124" y="156343"/>
+                  </a:cubicBezTo>
+                  <a:lnTo>
+                    <a:pt x="45395" y="156343"/>
+                  </a:lnTo>
+                  <a:cubicBezTo>
+                    <a:pt x="33356" y="156343"/>
+                    <a:pt x="21809" y="151561"/>
+                    <a:pt x="13296" y="143048"/>
+                  </a:cubicBezTo>
+                  <a:cubicBezTo>
+                    <a:pt x="4783" y="134534"/>
+                    <a:pt x="0" y="122988"/>
+                    <a:pt x="0" y="110948"/>
+                  </a:cubicBezTo>
+                  <a:lnTo>
+                    <a:pt x="0" y="45395"/>
+                  </a:lnTo>
+                  <a:cubicBezTo>
+                    <a:pt x="0" y="33356"/>
+                    <a:pt x="4783" y="21809"/>
+                    <a:pt x="13296" y="13296"/>
+                  </a:cubicBezTo>
+                  <a:cubicBezTo>
+                    <a:pt x="21809" y="4783"/>
+                    <a:pt x="33356" y="0"/>
+                    <a:pt x="45395" y="0"/>
+                  </a:cubicBezTo>
                   <a:close/>
                 </a:path>
               </a:pathLst>
             </a:custGeom>
-            <a:blipFill>
-              <a:blip r:embed="rId7">
-                <a:extLst>
-                  <a:ext uri="{96DAC541-7B7A-43D3-8B79-37D633B846F1}">
-                    <asvg:svgBlip xmlns:asvg="http://schemas.microsoft.com/office/drawing/2016/SVG/main" r:embed="rId8"/>
-                  </a:ext>
-                </a:extLst>
-              </a:blip>
-              <a:stretch>
-                <a:fillRect/>
-              </a:stretch>
-            </a:blipFill>
+            <a:solidFill>
+              <a:srgbClr val="000000"/>
+            </a:solidFill>
+            <a:ln w="28575" cap="sq">
+              <a:solidFill>
+                <a:srgbClr val="70767A"/>
+              </a:solidFill>
+              <a:prstDash val="solid"/>
+              <a:miter/>
+            </a:ln>
           </p:spPr>
         </p:sp>
+        <p:sp>
+          <p:nvSpPr>
+            <p:cNvPr id="459" name="TextBox 459"/>
+            <p:cNvSpPr txBox="1"/>
+            <p:nvPr/>
+          </p:nvSpPr>
+          <p:spPr>
+            <a:xfrm>
+              <a:off x="0" y="-38100"/>
+              <a:ext cx="924520" cy="194443"/>
+            </a:xfrm>
+            <a:prstGeom prst="rect">
+              <a:avLst/>
+            </a:prstGeom>
+          </p:spPr>
+          <p:txBody>
+            <a:bodyPr lIns="24681" tIns="24681" rIns="24681" bIns="24681" rtlCol="0" anchor="ctr"/>
+            <a:lstStyle/>
+            <a:p>
+              <a:pPr algn="ctr">
+                <a:lnSpc>
+                  <a:spcPts val="2660"/>
+                </a:lnSpc>
+                <a:spcBef>
+                  <a:spcPct val="0"/>
+                </a:spcBef>
+              </a:pPr>
+            </a:p>
+          </p:txBody>
+        </p:sp>
       </p:grpSp>
+      <p:sp>
+        <p:nvSpPr>
+          <p:cNvPr id="460" name="AutoShape 460"/>
+          <p:cNvSpPr/>
+          <p:nvPr/>
+        </p:nvSpPr>
+        <p:spPr>
+          <a:xfrm flipV="1">
+            <a:off x="2137410" y="9922510"/>
+            <a:ext cx="0" cy="288290"/>
+          </a:xfrm>
+          <a:prstGeom prst="line">
+            <a:avLst/>
+          </a:prstGeom>
+          <a:ln w="19050" cap="flat">
+            <a:solidFill>
+              <a:srgbClr val="70767A"/>
+            </a:solidFill>
+            <a:prstDash val="solid"/>
+            <a:headEnd type="none" w="sm" len="sm"/>
+            <a:tailEnd type="none" w="sm" len="sm"/>
+          </a:ln>
+        </p:spPr>
+      </p:sp>
+      <p:grpSp>
+        <p:nvGrpSpPr>
+          <p:cNvPr id="461" name="Group 461"/>
+          <p:cNvGrpSpPr/>
+          <p:nvPr/>
+        </p:nvGrpSpPr>
+        <p:grpSpPr>
+          <a:xfrm rot="0">
+            <a:off x="2028825" y="10046970"/>
+            <a:ext cx="16510" cy="16510"/>
+            <a:chOff x="0" y="0"/>
+            <a:chExt cx="523151" cy="523151"/>
+          </a:xfrm>
+        </p:grpSpPr>
+        <p:sp>
+          <p:nvSpPr>
+            <p:cNvPr id="462" name="Freeform 462"/>
+            <p:cNvSpPr/>
+            <p:nvPr/>
+          </p:nvSpPr>
+          <p:spPr>
+            <a:xfrm>
+              <a:off x="0" y="0"/>
+              <a:ext cx="523151" cy="523151"/>
+            </a:xfrm>
+            <a:custGeom>
+              <a:avLst/>
+              <a:gdLst/>
+              <a:ahLst/>
+              <a:cxnLst/>
+              <a:rect l="l" t="t" r="r" b="b"/>
+              <a:pathLst>
+                <a:path w="523151" h="523151">
+                  <a:moveTo>
+                    <a:pt x="261575" y="0"/>
+                  </a:moveTo>
+                  <a:cubicBezTo>
+                    <a:pt x="117111" y="0"/>
+                    <a:pt x="0" y="117111"/>
+                    <a:pt x="0" y="261575"/>
+                  </a:cubicBezTo>
+                  <a:cubicBezTo>
+                    <a:pt x="0" y="406040"/>
+                    <a:pt x="117111" y="523151"/>
+                    <a:pt x="261575" y="523151"/>
+                  </a:cubicBezTo>
+                  <a:cubicBezTo>
+                    <a:pt x="406040" y="523151"/>
+                    <a:pt x="523151" y="406040"/>
+                    <a:pt x="523151" y="261575"/>
+                  </a:cubicBezTo>
+                  <a:cubicBezTo>
+                    <a:pt x="523151" y="117111"/>
+                    <a:pt x="406040" y="0"/>
+                    <a:pt x="261575" y="0"/>
+                  </a:cubicBezTo>
+                  <a:close/>
+                </a:path>
+              </a:pathLst>
+            </a:custGeom>
+            <a:solidFill>
+              <a:srgbClr val="2F3238"/>
+            </a:solidFill>
+          </p:spPr>
+        </p:sp>
+        <p:sp>
+          <p:nvSpPr>
+            <p:cNvPr id="463" name="TextBox 463"/>
+            <p:cNvSpPr txBox="1"/>
+            <p:nvPr/>
+          </p:nvSpPr>
+          <p:spPr>
+            <a:xfrm>
+              <a:off x="49045" y="10945"/>
+              <a:ext cx="425060" cy="463160"/>
+            </a:xfrm>
+            <a:prstGeom prst="rect">
+              <a:avLst/>
+            </a:prstGeom>
+          </p:spPr>
+          <p:txBody>
+            <a:bodyPr lIns="17901" tIns="17901" rIns="17901" bIns="17901" rtlCol="0" anchor="ctr"/>
+            <a:lstStyle/>
+            <a:p>
+              <a:pPr algn="ctr">
+                <a:lnSpc>
+                  <a:spcPts val="2660"/>
+                </a:lnSpc>
+              </a:pPr>
+            </a:p>
+          </p:txBody>
+        </p:sp>
+      </p:grpSp>
+      <p:grpSp>
+        <p:nvGrpSpPr>
+          <p:cNvPr id="464" name="Group 464"/>
+          <p:cNvGrpSpPr/>
+          <p:nvPr/>
+        </p:nvGrpSpPr>
+        <p:grpSpPr>
+          <a:xfrm rot="0">
+            <a:off x="2018030" y="10050780"/>
+            <a:ext cx="16510" cy="16510"/>
+            <a:chOff x="0" y="0"/>
+            <a:chExt cx="523151" cy="523151"/>
+          </a:xfrm>
+        </p:grpSpPr>
+        <p:sp>
+          <p:nvSpPr>
+            <p:cNvPr id="465" name="Freeform 465"/>
+            <p:cNvSpPr/>
+            <p:nvPr/>
+          </p:nvSpPr>
+          <p:spPr>
+            <a:xfrm>
+              <a:off x="0" y="0"/>
+              <a:ext cx="523151" cy="523151"/>
+            </a:xfrm>
+            <a:custGeom>
+              <a:avLst/>
+              <a:gdLst/>
+              <a:ahLst/>
+              <a:cxnLst/>
+              <a:rect l="l" t="t" r="r" b="b"/>
+              <a:pathLst>
+                <a:path w="523151" h="523151">
+                  <a:moveTo>
+                    <a:pt x="261575" y="0"/>
+                  </a:moveTo>
+                  <a:cubicBezTo>
+                    <a:pt x="117111" y="0"/>
+                    <a:pt x="0" y="117111"/>
+                    <a:pt x="0" y="261575"/>
+                  </a:cubicBezTo>
+                  <a:cubicBezTo>
+                    <a:pt x="0" y="406040"/>
+                    <a:pt x="117111" y="523151"/>
+                    <a:pt x="261575" y="523151"/>
+                  </a:cubicBezTo>
+                  <a:cubicBezTo>
+                    <a:pt x="406040" y="523151"/>
+                    <a:pt x="523151" y="406040"/>
+                    <a:pt x="523151" y="261575"/>
+                  </a:cubicBezTo>
+                  <a:cubicBezTo>
+                    <a:pt x="523151" y="117111"/>
+                    <a:pt x="406040" y="0"/>
+                    <a:pt x="261575" y="0"/>
+                  </a:cubicBezTo>
+                  <a:close/>
+                </a:path>
+              </a:pathLst>
+            </a:custGeom>
+            <a:solidFill>
+              <a:srgbClr val="2F3238"/>
+            </a:solidFill>
+          </p:spPr>
+        </p:sp>
+        <p:sp>
+          <p:nvSpPr>
+            <p:cNvPr id="466" name="TextBox 466"/>
+            <p:cNvSpPr txBox="1"/>
+            <p:nvPr/>
+          </p:nvSpPr>
+          <p:spPr>
+            <a:xfrm>
+              <a:off x="49045" y="10945"/>
+              <a:ext cx="425060" cy="463160"/>
+            </a:xfrm>
+            <a:prstGeom prst="rect">
+              <a:avLst/>
+            </a:prstGeom>
+          </p:spPr>
+          <p:txBody>
+            <a:bodyPr lIns="17901" tIns="17901" rIns="17901" bIns="17901" rtlCol="0" anchor="ctr"/>
+            <a:lstStyle/>
+            <a:p>
+              <a:pPr algn="ctr">
+                <a:lnSpc>
+                  <a:spcPts val="2660"/>
+                </a:lnSpc>
+              </a:pPr>
+            </a:p>
+          </p:txBody>
+        </p:sp>
+      </p:grpSp>
+      <p:sp>
+        <p:nvSpPr>
+          <p:cNvPr id="467" name="AutoShape 467"/>
+          <p:cNvSpPr/>
+          <p:nvPr/>
+        </p:nvSpPr>
+        <p:spPr>
+          <a:xfrm flipV="1">
+            <a:off x="1997075" y="9997440"/>
+            <a:ext cx="0" cy="139700"/>
+          </a:xfrm>
+          <a:prstGeom prst="line">
+            <a:avLst/>
+          </a:prstGeom>
+          <a:ln w="19050" cap="flat">
+            <a:solidFill>
+              <a:srgbClr val="FFFFFF"/>
+            </a:solidFill>
+            <a:prstDash val="solid"/>
+            <a:headEnd type="none" w="sm" len="sm"/>
+            <a:tailEnd type="none" w="sm" len="sm"/>
+          </a:ln>
+        </p:spPr>
+      </p:sp>
+      <p:sp>
+        <p:nvSpPr>
+          <p:cNvPr id="468" name="Freeform 468"/>
+          <p:cNvSpPr/>
+          <p:nvPr/>
+        </p:nvSpPr>
+        <p:spPr>
+          <a:xfrm rot="5400000">
+            <a:off x="1997075" y="9995535"/>
+            <a:ext cx="80010" cy="80010"/>
+          </a:xfrm>
+          <a:custGeom>
+            <a:avLst/>
+            <a:gdLst/>
+            <a:ahLst/>
+            <a:cxnLst/>
+            <a:rect l="l" t="t" r="r" b="b"/>
+            <a:pathLst>
+              <a:path w="80316" h="80316">
+                <a:moveTo>
+                  <a:pt x="0" y="0"/>
+                </a:moveTo>
+                <a:lnTo>
+                  <a:pt x="80316" y="0"/>
+                </a:lnTo>
+                <a:lnTo>
+                  <a:pt x="80316" y="80316"/>
+                </a:lnTo>
+                <a:lnTo>
+                  <a:pt x="0" y="80316"/>
+                </a:lnTo>
+                <a:lnTo>
+                  <a:pt x="0" y="0"/>
+                </a:lnTo>
+                <a:close/>
+              </a:path>
+            </a:pathLst>
+          </a:custGeom>
+          <a:blipFill>
+            <a:blip r:embed="rId7">
+              <a:extLst>
+                <a:ext uri="{96DAC541-7B7A-43D3-8B79-37D633B846F1}">
+                  <asvg:svgBlip xmlns:asvg="http://schemas.microsoft.com/office/drawing/2016/SVG/main" r:embed="rId8"/>
+                </a:ext>
+              </a:extLst>
+            </a:blip>
+            <a:stretch>
+              <a:fillRect/>
+            </a:stretch>
+          </a:blipFill>
+        </p:spPr>
+      </p:sp>
       <p:sp>
         <p:nvSpPr>
           <p:cNvPr id="469" name="Freeform 469"/>

</xml_diff>